<commit_message>
Added Source code in the ppt
</commit_message>
<xml_diff>
--- a/19042025-MCP-dotnet-dotnetblr/Intro to Model Context Protocol(MCP).pptx
+++ b/19042025-MCP-dotnet-dotnetblr/Intro to Model Context Protocol(MCP).pptx
@@ -5,7 +5,7 @@
     <p:sldMasterId id="2147483648" r:id="rId1"/>
   </p:sldMasterIdLst>
   <p:notesMasterIdLst>
-    <p:notesMasterId r:id="rId18"/>
+    <p:notesMasterId r:id="rId20"/>
   </p:notesMasterIdLst>
   <p:sldIdLst>
     <p:sldId id="256" r:id="rId2"/>
@@ -21,9 +21,11 @@
     <p:sldId id="262" r:id="rId12"/>
     <p:sldId id="337" r:id="rId13"/>
     <p:sldId id="339" r:id="rId14"/>
-    <p:sldId id="327" r:id="rId15"/>
-    <p:sldId id="326" r:id="rId16"/>
-    <p:sldId id="325" r:id="rId17"/>
+    <p:sldId id="343" r:id="rId15"/>
+    <p:sldId id="344" r:id="rId16"/>
+    <p:sldId id="345" r:id="rId17"/>
+    <p:sldId id="327" r:id="rId18"/>
+    <p:sldId id="326" r:id="rId19"/>
   </p:sldIdLst>
   <p:sldSz cx="12192000" cy="6858000"/>
   <p:notesSz cx="6858000" cy="9144000"/>
@@ -22256,90 +22258,6 @@
 </p:notesMaster>
 </file>
 
-<file path=ppt/notesSlides/notesSlide1.xml><?xml version="1.0" encoding="utf-8"?>
-<p:notes xmlns:a="http://schemas.openxmlformats.org/drawingml/2006/main" xmlns:r="http://schemas.openxmlformats.org/officeDocument/2006/relationships" xmlns:p="http://schemas.openxmlformats.org/presentationml/2006/main">
-  <p:cSld>
-    <p:spTree>
-      <p:nvGrpSpPr>
-        <p:cNvPr id="1" name=""/>
-        <p:cNvGrpSpPr/>
-        <p:nvPr/>
-      </p:nvGrpSpPr>
-      <p:grpSpPr>
-        <a:xfrm>
-          <a:off x="0" y="0"/>
-          <a:ext cx="0" cy="0"/>
-          <a:chOff x="0" y="0"/>
-          <a:chExt cx="0" cy="0"/>
-        </a:xfrm>
-      </p:grpSpPr>
-      <p:sp>
-        <p:nvSpPr>
-          <p:cNvPr id="2" name="Slide Image Placeholder 1"/>
-          <p:cNvSpPr>
-            <a:spLocks noGrp="1" noRot="1" noChangeAspect="1"/>
-          </p:cNvSpPr>
-          <p:nvPr>
-            <p:ph type="sldImg"/>
-          </p:nvPr>
-        </p:nvSpPr>
-        <p:spPr/>
-      </p:sp>
-      <p:sp>
-        <p:nvSpPr>
-          <p:cNvPr id="3" name="Notes Placeholder 2"/>
-          <p:cNvSpPr>
-            <a:spLocks noGrp="1"/>
-          </p:cNvSpPr>
-          <p:nvPr>
-            <p:ph type="body" idx="1"/>
-          </p:nvPr>
-        </p:nvSpPr>
-        <p:spPr/>
-        <p:txBody>
-          <a:bodyPr/>
-          <a:lstStyle/>
-          <a:p>
-            <a:endParaRPr lang="en-US" dirty="0"/>
-          </a:p>
-        </p:txBody>
-      </p:sp>
-      <p:sp>
-        <p:nvSpPr>
-          <p:cNvPr id="4" name="Slide Number Placeholder 3"/>
-          <p:cNvSpPr>
-            <a:spLocks noGrp="1"/>
-          </p:cNvSpPr>
-          <p:nvPr>
-            <p:ph type="sldNum" sz="quarter" idx="10"/>
-          </p:nvPr>
-        </p:nvSpPr>
-        <p:spPr/>
-        <p:txBody>
-          <a:bodyPr/>
-          <a:lstStyle/>
-          <a:p>
-            <a:fld id="{55849CEA-452E-49F3-92ED-210B64DD3C6C}" type="slidenum">
-              <a:rPr lang="en-US" smtClean="0"/>
-              <a:t>16</a:t>
-            </a:fld>
-            <a:endParaRPr lang="en-US" dirty="0"/>
-          </a:p>
-        </p:txBody>
-      </p:sp>
-    </p:spTree>
-    <p:extLst>
-      <p:ext uri="{BB962C8B-B14F-4D97-AF65-F5344CB8AC3E}">
-        <p14:creationId xmlns:p14="http://schemas.microsoft.com/office/powerpoint/2010/main" val="2684658667"/>
-      </p:ext>
-    </p:extLst>
-  </p:cSld>
-  <p:clrMapOvr>
-    <a:masterClrMapping/>
-  </p:clrMapOvr>
-</p:notes>
-</file>
-
 <file path=ppt/slideLayouts/slideLayout1.xml><?xml version="1.0" encoding="utf-8"?>
 <p:sldLayout xmlns:a="http://schemas.openxmlformats.org/drawingml/2006/main" xmlns:r="http://schemas.openxmlformats.org/officeDocument/2006/relationships" xmlns:p="http://schemas.openxmlformats.org/presentationml/2006/main" type="title" preserve="1">
   <p:cSld name="Title Slide">
@@ -35057,6 +34975,887 @@
           <a:chExt cx="0" cy="0"/>
         </a:xfrm>
       </p:grpSpPr>
+      <p:sp useBgFill="1">
+        <p:nvSpPr>
+          <p:cNvPr id="12" name="Rectangle 11">
+            <a:extLst>
+              <a:ext uri="{FF2B5EF4-FFF2-40B4-BE49-F238E27FC236}">
+                <a16:creationId xmlns:a16="http://schemas.microsoft.com/office/drawing/2014/main" id="{B95B9BA8-1D69-4796-85F5-B6D0BD52354B}"/>
+              </a:ext>
+              <a:ext uri="{C183D7F6-B498-43B3-948B-1728B52AA6E4}">
+                <adec:decorative xmlns:adec="http://schemas.microsoft.com/office/drawing/2017/decorative" val="1"/>
+              </a:ext>
+            </a:extLst>
+          </p:cNvPr>
+          <p:cNvSpPr>
+            <a:spLocks noGrp="1" noRot="1" noChangeAspect="1" noMove="1" noResize="1" noEditPoints="1" noAdjustHandles="1" noChangeArrowheads="1" noChangeShapeType="1" noTextEdit="1"/>
+          </p:cNvSpPr>
+          <p:nvPr>
+            <p:extLst>
+              <p:ext uri="{386F3935-93C4-4BCD-93E2-E3B085C9AB24}">
+                <p16:designElem xmlns:p16="http://schemas.microsoft.com/office/powerpoint/2015/main" val="1"/>
+              </p:ext>
+            </p:extLst>
+          </p:nvPr>
+        </p:nvSpPr>
+        <p:spPr>
+          <a:xfrm>
+            <a:off x="0" y="0"/>
+            <a:ext cx="12192000" cy="6858000"/>
+          </a:xfrm>
+          <a:prstGeom prst="rect">
+            <a:avLst/>
+          </a:prstGeom>
+          <a:solidFill>
+            <a:schemeClr val="tx1"/>
+          </a:solidFill>
+          <a:ln w="12700" cap="flat" cmpd="sng" algn="ctr">
+            <a:noFill/>
+            <a:prstDash val="solid"/>
+            <a:miter lim="800000"/>
+          </a:ln>
+          <a:effectLst/>
+        </p:spPr>
+        <p:style>
+          <a:lnRef idx="2">
+            <a:schemeClr val="accent1">
+              <a:shade val="50000"/>
+            </a:schemeClr>
+          </a:lnRef>
+          <a:fillRef idx="1">
+            <a:schemeClr val="accent1"/>
+          </a:fillRef>
+          <a:effectRef idx="0">
+            <a:schemeClr val="accent1"/>
+          </a:effectRef>
+          <a:fontRef idx="minor">
+            <a:schemeClr val="lt1"/>
+          </a:fontRef>
+        </p:style>
+        <p:txBody>
+          <a:bodyPr rtlCol="0" anchor="ctr"/>
+          <a:lstStyle/>
+          <a:p>
+            <a:pPr algn="ctr"/>
+            <a:endParaRPr lang="en-US"/>
+          </a:p>
+        </p:txBody>
+      </p:sp>
+      <p:sp>
+        <p:nvSpPr>
+          <p:cNvPr id="2" name="Title 1">
+            <a:extLst>
+              <a:ext uri="{FF2B5EF4-FFF2-40B4-BE49-F238E27FC236}">
+                <a16:creationId xmlns:a16="http://schemas.microsoft.com/office/drawing/2014/main" id="{179FD605-F3B5-A7AC-F1CF-3624C1CA1E33}"/>
+              </a:ext>
+            </a:extLst>
+          </p:cNvPr>
+          <p:cNvSpPr>
+            <a:spLocks noGrp="1"/>
+          </p:cNvSpPr>
+          <p:nvPr>
+            <p:ph type="title"/>
+          </p:nvPr>
+        </p:nvSpPr>
+        <p:spPr>
+          <a:xfrm>
+            <a:off x="838199" y="371752"/>
+            <a:ext cx="9321801" cy="1323439"/>
+          </a:xfrm>
+        </p:spPr>
+        <p:txBody>
+          <a:bodyPr anchor="t">
+            <a:normAutofit/>
+          </a:bodyPr>
+          <a:lstStyle/>
+          <a:p>
+            <a:r>
+              <a:rPr lang="en-US" sz="4000" dirty="0">
+                <a:solidFill>
+                  <a:schemeClr val="bg1"/>
+                </a:solidFill>
+              </a:rPr>
+              <a:t>MCP Server – Time Source Code - Packages</a:t>
+            </a:r>
+            <a:endParaRPr lang="en-IN" sz="4000" dirty="0">
+              <a:solidFill>
+                <a:schemeClr val="bg1"/>
+              </a:solidFill>
+            </a:endParaRPr>
+          </a:p>
+        </p:txBody>
+      </p:sp>
+      <p:sp>
+        <p:nvSpPr>
+          <p:cNvPr id="6" name="Content Placeholder 2">
+            <a:extLst>
+              <a:ext uri="{FF2B5EF4-FFF2-40B4-BE49-F238E27FC236}">
+                <a16:creationId xmlns:a16="http://schemas.microsoft.com/office/drawing/2014/main" id="{1C2E3B3C-84EA-0B36-DAC3-35CD98BD098A}"/>
+              </a:ext>
+            </a:extLst>
+          </p:cNvPr>
+          <p:cNvSpPr txBox="1">
+            <a:spLocks/>
+          </p:cNvSpPr>
+          <p:nvPr/>
+        </p:nvSpPr>
+        <p:spPr>
+          <a:xfrm>
+            <a:off x="838199" y="1506766"/>
+            <a:ext cx="11206480" cy="1510754"/>
+          </a:xfrm>
+          <a:prstGeom prst="rect">
+            <a:avLst/>
+          </a:prstGeom>
+        </p:spPr>
+        <p:txBody>
+          <a:bodyPr vert="horz" lIns="91440" tIns="45720" rIns="91440" bIns="45720" rtlCol="0">
+            <a:normAutofit/>
+          </a:bodyPr>
+          <a:lstStyle>
+            <a:lvl1pPr marL="228600" indent="-228600" algn="l" defTabSz="914400" rtl="0" eaLnBrk="1" latinLnBrk="0" hangingPunct="1">
+              <a:lnSpc>
+                <a:spcPct val="90000"/>
+              </a:lnSpc>
+              <a:spcBef>
+                <a:spcPts val="1000"/>
+              </a:spcBef>
+              <a:buFont typeface="Arial" panose="020B0604020202020204" pitchFamily="34" charset="0"/>
+              <a:buChar char="•"/>
+              <a:defRPr sz="2800" kern="1200">
+                <a:solidFill>
+                  <a:schemeClr val="tx1"/>
+                </a:solidFill>
+                <a:latin typeface="+mn-lt"/>
+                <a:ea typeface="+mn-ea"/>
+                <a:cs typeface="+mn-cs"/>
+              </a:defRPr>
+            </a:lvl1pPr>
+            <a:lvl2pPr marL="685800" indent="-228600" algn="l" defTabSz="914400" rtl="0" eaLnBrk="1" latinLnBrk="0" hangingPunct="1">
+              <a:lnSpc>
+                <a:spcPct val="90000"/>
+              </a:lnSpc>
+              <a:spcBef>
+                <a:spcPts val="500"/>
+              </a:spcBef>
+              <a:buFont typeface="Arial" panose="020B0604020202020204" pitchFamily="34" charset="0"/>
+              <a:buChar char="•"/>
+              <a:defRPr sz="2400" kern="1200">
+                <a:solidFill>
+                  <a:schemeClr val="tx1"/>
+                </a:solidFill>
+                <a:latin typeface="+mn-lt"/>
+                <a:ea typeface="+mn-ea"/>
+                <a:cs typeface="+mn-cs"/>
+              </a:defRPr>
+            </a:lvl2pPr>
+            <a:lvl3pPr marL="1143000" indent="-228600" algn="l" defTabSz="914400" rtl="0" eaLnBrk="1" latinLnBrk="0" hangingPunct="1">
+              <a:lnSpc>
+                <a:spcPct val="90000"/>
+              </a:lnSpc>
+              <a:spcBef>
+                <a:spcPts val="500"/>
+              </a:spcBef>
+              <a:buFont typeface="Arial" panose="020B0604020202020204" pitchFamily="34" charset="0"/>
+              <a:buChar char="•"/>
+              <a:defRPr sz="2000" kern="1200">
+                <a:solidFill>
+                  <a:schemeClr val="tx1"/>
+                </a:solidFill>
+                <a:latin typeface="+mn-lt"/>
+                <a:ea typeface="+mn-ea"/>
+                <a:cs typeface="+mn-cs"/>
+              </a:defRPr>
+            </a:lvl3pPr>
+            <a:lvl4pPr marL="1600200" indent="-228600" algn="l" defTabSz="914400" rtl="0" eaLnBrk="1" latinLnBrk="0" hangingPunct="1">
+              <a:lnSpc>
+                <a:spcPct val="90000"/>
+              </a:lnSpc>
+              <a:spcBef>
+                <a:spcPts val="500"/>
+              </a:spcBef>
+              <a:buFont typeface="Arial" panose="020B0604020202020204" pitchFamily="34" charset="0"/>
+              <a:buChar char="•"/>
+              <a:defRPr sz="1800" kern="1200">
+                <a:solidFill>
+                  <a:schemeClr val="tx1"/>
+                </a:solidFill>
+                <a:latin typeface="+mn-lt"/>
+                <a:ea typeface="+mn-ea"/>
+                <a:cs typeface="+mn-cs"/>
+              </a:defRPr>
+            </a:lvl4pPr>
+            <a:lvl5pPr marL="2057400" indent="-228600" algn="l" defTabSz="914400" rtl="0" eaLnBrk="1" latinLnBrk="0" hangingPunct="1">
+              <a:lnSpc>
+                <a:spcPct val="90000"/>
+              </a:lnSpc>
+              <a:spcBef>
+                <a:spcPts val="500"/>
+              </a:spcBef>
+              <a:buFont typeface="Arial" panose="020B0604020202020204" pitchFamily="34" charset="0"/>
+              <a:buChar char="•"/>
+              <a:defRPr sz="1800" kern="1200">
+                <a:solidFill>
+                  <a:schemeClr val="tx1"/>
+                </a:solidFill>
+                <a:latin typeface="+mn-lt"/>
+                <a:ea typeface="+mn-ea"/>
+                <a:cs typeface="+mn-cs"/>
+              </a:defRPr>
+            </a:lvl5pPr>
+            <a:lvl6pPr marL="2514600" indent="-228600" algn="l" defTabSz="914400" rtl="0" eaLnBrk="1" latinLnBrk="0" hangingPunct="1">
+              <a:lnSpc>
+                <a:spcPct val="90000"/>
+              </a:lnSpc>
+              <a:spcBef>
+                <a:spcPts val="500"/>
+              </a:spcBef>
+              <a:buFont typeface="Arial" panose="020B0604020202020204" pitchFamily="34" charset="0"/>
+              <a:buChar char="•"/>
+              <a:defRPr sz="1800" kern="1200">
+                <a:solidFill>
+                  <a:schemeClr val="tx1"/>
+                </a:solidFill>
+                <a:latin typeface="+mn-lt"/>
+                <a:ea typeface="+mn-ea"/>
+                <a:cs typeface="+mn-cs"/>
+              </a:defRPr>
+            </a:lvl6pPr>
+            <a:lvl7pPr marL="2971800" indent="-228600" algn="l" defTabSz="914400" rtl="0" eaLnBrk="1" latinLnBrk="0" hangingPunct="1">
+              <a:lnSpc>
+                <a:spcPct val="90000"/>
+              </a:lnSpc>
+              <a:spcBef>
+                <a:spcPts val="500"/>
+              </a:spcBef>
+              <a:buFont typeface="Arial" panose="020B0604020202020204" pitchFamily="34" charset="0"/>
+              <a:buChar char="•"/>
+              <a:defRPr sz="1800" kern="1200">
+                <a:solidFill>
+                  <a:schemeClr val="tx1"/>
+                </a:solidFill>
+                <a:latin typeface="+mn-lt"/>
+                <a:ea typeface="+mn-ea"/>
+                <a:cs typeface="+mn-cs"/>
+              </a:defRPr>
+            </a:lvl7pPr>
+            <a:lvl8pPr marL="3429000" indent="-228600" algn="l" defTabSz="914400" rtl="0" eaLnBrk="1" latinLnBrk="0" hangingPunct="1">
+              <a:lnSpc>
+                <a:spcPct val="90000"/>
+              </a:lnSpc>
+              <a:spcBef>
+                <a:spcPts val="500"/>
+              </a:spcBef>
+              <a:buFont typeface="Arial" panose="020B0604020202020204" pitchFamily="34" charset="0"/>
+              <a:buChar char="•"/>
+              <a:defRPr sz="1800" kern="1200">
+                <a:solidFill>
+                  <a:schemeClr val="tx1"/>
+                </a:solidFill>
+                <a:latin typeface="+mn-lt"/>
+                <a:ea typeface="+mn-ea"/>
+                <a:cs typeface="+mn-cs"/>
+              </a:defRPr>
+            </a:lvl8pPr>
+            <a:lvl9pPr marL="3886200" indent="-228600" algn="l" defTabSz="914400" rtl="0" eaLnBrk="1" latinLnBrk="0" hangingPunct="1">
+              <a:lnSpc>
+                <a:spcPct val="90000"/>
+              </a:lnSpc>
+              <a:spcBef>
+                <a:spcPts val="500"/>
+              </a:spcBef>
+              <a:buFont typeface="Arial" panose="020B0604020202020204" pitchFamily="34" charset="0"/>
+              <a:buChar char="•"/>
+              <a:defRPr sz="1800" kern="1200">
+                <a:solidFill>
+                  <a:schemeClr val="tx1"/>
+                </a:solidFill>
+                <a:latin typeface="+mn-lt"/>
+                <a:ea typeface="+mn-ea"/>
+                <a:cs typeface="+mn-cs"/>
+              </a:defRPr>
+            </a:lvl9pPr>
+          </a:lstStyle>
+          <a:p>
+            <a:pPr lvl="1"/>
+            <a:r>
+              <a:rPr lang="en-IN" dirty="0">
+                <a:solidFill>
+                  <a:schemeClr val="bg1"/>
+                </a:solidFill>
+                <a:latin typeface="Consolas" panose="020B0609020204030204" pitchFamily="49" charset="0"/>
+                <a:hlinkClick r:id="rId2"/>
+              </a:rPr>
+              <a:t>Microsoft.Extensions.Hosting</a:t>
+            </a:r>
+            <a:endParaRPr lang="en-IN" dirty="0">
+              <a:solidFill>
+                <a:schemeClr val="bg1"/>
+              </a:solidFill>
+              <a:latin typeface="Consolas" panose="020B0609020204030204" pitchFamily="49" charset="0"/>
+            </a:endParaRPr>
+          </a:p>
+          <a:p>
+            <a:pPr lvl="1"/>
+            <a:r>
+              <a:rPr lang="en-IN" dirty="0">
+                <a:solidFill>
+                  <a:schemeClr val="bg1"/>
+                </a:solidFill>
+                <a:latin typeface="Consolas" panose="020B0609020204030204" pitchFamily="49" charset="0"/>
+                <a:hlinkClick r:id="rId3"/>
+              </a:rPr>
+              <a:t>ModelContextProtocol</a:t>
+            </a:r>
+            <a:r>
+              <a:rPr lang="en-IN" dirty="0">
+                <a:solidFill>
+                  <a:schemeClr val="bg1"/>
+                </a:solidFill>
+                <a:latin typeface="Consolas" panose="020B0609020204030204" pitchFamily="49" charset="0"/>
+              </a:rPr>
+              <a:t> </a:t>
+            </a:r>
+            <a:endParaRPr lang="en-IN" dirty="0">
+              <a:solidFill>
+                <a:schemeClr val="bg1"/>
+              </a:solidFill>
+            </a:endParaRPr>
+          </a:p>
+        </p:txBody>
+      </p:sp>
+      <p:pic>
+        <p:nvPicPr>
+          <p:cNvPr id="7" name="Picture 6">
+            <a:extLst>
+              <a:ext uri="{FF2B5EF4-FFF2-40B4-BE49-F238E27FC236}">
+                <a16:creationId xmlns:a16="http://schemas.microsoft.com/office/drawing/2014/main" id="{CB946C24-E122-70B9-835B-EFF5EA0FD062}"/>
+              </a:ext>
+            </a:extLst>
+          </p:cNvPr>
+          <p:cNvPicPr>
+            <a:picLocks noChangeAspect="1"/>
+          </p:cNvPicPr>
+          <p:nvPr/>
+        </p:nvPicPr>
+        <p:blipFill>
+          <a:blip r:embed="rId4"/>
+          <a:stretch>
+            <a:fillRect/>
+          </a:stretch>
+        </p:blipFill>
+        <p:spPr>
+          <a:xfrm>
+            <a:off x="1640919" y="3486942"/>
+            <a:ext cx="8910162" cy="1262858"/>
+          </a:xfrm>
+          <a:prstGeom prst="rect">
+            <a:avLst/>
+          </a:prstGeom>
+        </p:spPr>
+      </p:pic>
+    </p:spTree>
+    <p:extLst>
+      <p:ext uri="{BB962C8B-B14F-4D97-AF65-F5344CB8AC3E}">
+        <p14:creationId xmlns:p14="http://schemas.microsoft.com/office/powerpoint/2010/main" val="2987187634"/>
+      </p:ext>
+    </p:extLst>
+  </p:cSld>
+  <p:clrMapOvr>
+    <a:masterClrMapping/>
+  </p:clrMapOvr>
+</p:sld>
+</file>
+
+<file path=ppt/slides/slide15.xml><?xml version="1.0" encoding="utf-8"?>
+<p:sld xmlns:a="http://schemas.openxmlformats.org/drawingml/2006/main" xmlns:r="http://schemas.openxmlformats.org/officeDocument/2006/relationships" xmlns:p="http://schemas.openxmlformats.org/presentationml/2006/main">
+  <p:cSld>
+    <p:bg>
+      <p:bgPr>
+        <a:solidFill>
+          <a:schemeClr val="bg1"/>
+        </a:solidFill>
+        <a:effectLst/>
+      </p:bgPr>
+    </p:bg>
+    <p:spTree>
+      <p:nvGrpSpPr>
+        <p:cNvPr id="1" name="">
+          <a:extLst>
+            <a:ext uri="{FF2B5EF4-FFF2-40B4-BE49-F238E27FC236}">
+              <a16:creationId xmlns:a16="http://schemas.microsoft.com/office/drawing/2014/main" id="{7A39DD05-57A9-5DC3-BA04-8E98B7581419}"/>
+            </a:ext>
+          </a:extLst>
+        </p:cNvPr>
+        <p:cNvGrpSpPr/>
+        <p:nvPr/>
+      </p:nvGrpSpPr>
+      <p:grpSpPr>
+        <a:xfrm>
+          <a:off x="0" y="0"/>
+          <a:ext cx="0" cy="0"/>
+          <a:chOff x="0" y="0"/>
+          <a:chExt cx="0" cy="0"/>
+        </a:xfrm>
+      </p:grpSpPr>
+      <p:sp useBgFill="1">
+        <p:nvSpPr>
+          <p:cNvPr id="12" name="Rectangle 11">
+            <a:extLst>
+              <a:ext uri="{FF2B5EF4-FFF2-40B4-BE49-F238E27FC236}">
+                <a16:creationId xmlns:a16="http://schemas.microsoft.com/office/drawing/2014/main" id="{860C1F64-05D1-D101-419C-A94DA679CC38}"/>
+              </a:ext>
+              <a:ext uri="{C183D7F6-B498-43B3-948B-1728B52AA6E4}">
+                <adec:decorative xmlns:adec="http://schemas.microsoft.com/office/drawing/2017/decorative" val="1"/>
+              </a:ext>
+            </a:extLst>
+          </p:cNvPr>
+          <p:cNvSpPr>
+            <a:spLocks noGrp="1" noRot="1" noChangeAspect="1" noMove="1" noResize="1" noEditPoints="1" noAdjustHandles="1" noChangeArrowheads="1" noChangeShapeType="1" noTextEdit="1"/>
+          </p:cNvSpPr>
+          <p:nvPr>
+            <p:extLst>
+              <p:ext uri="{386F3935-93C4-4BCD-93E2-E3B085C9AB24}">
+                <p16:designElem xmlns:p16="http://schemas.microsoft.com/office/powerpoint/2015/main" val="1"/>
+              </p:ext>
+            </p:extLst>
+          </p:nvPr>
+        </p:nvSpPr>
+        <p:spPr>
+          <a:xfrm>
+            <a:off x="0" y="0"/>
+            <a:ext cx="12192000" cy="6858000"/>
+          </a:xfrm>
+          <a:prstGeom prst="rect">
+            <a:avLst/>
+          </a:prstGeom>
+          <a:solidFill>
+            <a:schemeClr val="tx1"/>
+          </a:solidFill>
+          <a:ln w="12700" cap="flat" cmpd="sng" algn="ctr">
+            <a:noFill/>
+            <a:prstDash val="solid"/>
+            <a:miter lim="800000"/>
+          </a:ln>
+          <a:effectLst/>
+        </p:spPr>
+        <p:style>
+          <a:lnRef idx="2">
+            <a:schemeClr val="accent1">
+              <a:shade val="50000"/>
+            </a:schemeClr>
+          </a:lnRef>
+          <a:fillRef idx="1">
+            <a:schemeClr val="accent1"/>
+          </a:fillRef>
+          <a:effectRef idx="0">
+            <a:schemeClr val="accent1"/>
+          </a:effectRef>
+          <a:fontRef idx="minor">
+            <a:schemeClr val="lt1"/>
+          </a:fontRef>
+        </p:style>
+        <p:txBody>
+          <a:bodyPr rtlCol="0" anchor="ctr"/>
+          <a:lstStyle/>
+          <a:p>
+            <a:pPr marL="0" marR="0" lvl="0" indent="0" algn="ctr" defTabSz="914400" rtl="0" eaLnBrk="1" fontAlgn="auto" latinLnBrk="0" hangingPunct="1">
+              <a:lnSpc>
+                <a:spcPct val="100000"/>
+              </a:lnSpc>
+              <a:spcBef>
+                <a:spcPts val="0"/>
+              </a:spcBef>
+              <a:spcAft>
+                <a:spcPts val="0"/>
+              </a:spcAft>
+              <a:buClrTx/>
+              <a:buSzTx/>
+              <a:buFontTx/>
+              <a:buNone/>
+              <a:tabLst/>
+              <a:defRPr/>
+            </a:pPr>
+            <a:endParaRPr kumimoji="0" lang="en-US" sz="1800" b="0" i="0" u="none" strike="noStrike" kern="1200" cap="none" spc="0" normalizeH="0" baseline="0" noProof="0">
+              <a:ln>
+                <a:noFill/>
+              </a:ln>
+              <a:solidFill>
+                <a:prstClr val="white"/>
+              </a:solidFill>
+              <a:effectLst/>
+              <a:uLnTx/>
+              <a:uFillTx/>
+              <a:latin typeface="Aptos" panose="02110004020202020204"/>
+              <a:ea typeface="+mn-ea"/>
+              <a:cs typeface="+mn-cs"/>
+            </a:endParaRPr>
+          </a:p>
+        </p:txBody>
+      </p:sp>
+      <p:sp>
+        <p:nvSpPr>
+          <p:cNvPr id="2" name="Title 1">
+            <a:extLst>
+              <a:ext uri="{FF2B5EF4-FFF2-40B4-BE49-F238E27FC236}">
+                <a16:creationId xmlns:a16="http://schemas.microsoft.com/office/drawing/2014/main" id="{BF77F481-8F3E-489F-9254-7793B504C3E2}"/>
+              </a:ext>
+            </a:extLst>
+          </p:cNvPr>
+          <p:cNvSpPr>
+            <a:spLocks noGrp="1"/>
+          </p:cNvSpPr>
+          <p:nvPr>
+            <p:ph type="title"/>
+          </p:nvPr>
+        </p:nvSpPr>
+        <p:spPr>
+          <a:xfrm>
+            <a:off x="838199" y="371752"/>
+            <a:ext cx="8630921" cy="1323439"/>
+          </a:xfrm>
+        </p:spPr>
+        <p:txBody>
+          <a:bodyPr anchor="t">
+            <a:normAutofit/>
+          </a:bodyPr>
+          <a:lstStyle/>
+          <a:p>
+            <a:r>
+              <a:rPr lang="en-US" sz="4000" dirty="0">
+                <a:solidFill>
+                  <a:schemeClr val="bg1"/>
+                </a:solidFill>
+              </a:rPr>
+              <a:t>MCP Server – Time Source Code - Server</a:t>
+            </a:r>
+            <a:endParaRPr lang="en-IN" sz="4000" dirty="0">
+              <a:solidFill>
+                <a:schemeClr val="bg1"/>
+              </a:solidFill>
+            </a:endParaRPr>
+          </a:p>
+        </p:txBody>
+      </p:sp>
+      <p:sp>
+        <p:nvSpPr>
+          <p:cNvPr id="9" name="Content Placeholder 8">
+            <a:extLst>
+              <a:ext uri="{FF2B5EF4-FFF2-40B4-BE49-F238E27FC236}">
+                <a16:creationId xmlns:a16="http://schemas.microsoft.com/office/drawing/2014/main" id="{E807F23F-8E1D-6B60-D3EA-18805A42A8C8}"/>
+              </a:ext>
+            </a:extLst>
+          </p:cNvPr>
+          <p:cNvSpPr>
+            <a:spLocks noGrp="1"/>
+          </p:cNvSpPr>
+          <p:nvPr>
+            <p:ph idx="1"/>
+          </p:nvPr>
+        </p:nvSpPr>
+        <p:spPr>
+          <a:xfrm>
+            <a:off x="838200" y="3146400"/>
+            <a:ext cx="4391025" cy="2454300"/>
+          </a:xfrm>
+        </p:spPr>
+        <p:txBody>
+          <a:bodyPr>
+            <a:normAutofit/>
+          </a:bodyPr>
+          <a:lstStyle/>
+          <a:p>
+            <a:endParaRPr lang="en-US" sz="2400">
+              <a:solidFill>
+                <a:schemeClr val="bg1">
+                  <a:alpha val="80000"/>
+                </a:schemeClr>
+              </a:solidFill>
+            </a:endParaRPr>
+          </a:p>
+        </p:txBody>
+      </p:sp>
+      <p:pic>
+        <p:nvPicPr>
+          <p:cNvPr id="5" name="Content Placeholder 4">
+            <a:extLst>
+              <a:ext uri="{FF2B5EF4-FFF2-40B4-BE49-F238E27FC236}">
+                <a16:creationId xmlns:a16="http://schemas.microsoft.com/office/drawing/2014/main" id="{7BC8B139-3D06-59EB-4151-6FBD96508D75}"/>
+              </a:ext>
+            </a:extLst>
+          </p:cNvPr>
+          <p:cNvPicPr>
+            <a:picLocks noChangeAspect="1"/>
+          </p:cNvPicPr>
+          <p:nvPr/>
+        </p:nvPicPr>
+        <p:blipFill>
+          <a:blip r:embed="rId2"/>
+          <a:stretch>
+            <a:fillRect/>
+          </a:stretch>
+        </p:blipFill>
+        <p:spPr>
+          <a:xfrm>
+            <a:off x="835024" y="1333702"/>
+            <a:ext cx="10442576" cy="4973498"/>
+          </a:xfrm>
+          <a:prstGeom prst="rect">
+            <a:avLst/>
+          </a:prstGeom>
+        </p:spPr>
+      </p:pic>
+    </p:spTree>
+    <p:extLst>
+      <p:ext uri="{BB962C8B-B14F-4D97-AF65-F5344CB8AC3E}">
+        <p14:creationId xmlns:p14="http://schemas.microsoft.com/office/powerpoint/2010/main" val="3549416533"/>
+      </p:ext>
+    </p:extLst>
+  </p:cSld>
+  <p:clrMapOvr>
+    <a:masterClrMapping/>
+  </p:clrMapOvr>
+</p:sld>
+</file>
+
+<file path=ppt/slides/slide16.xml><?xml version="1.0" encoding="utf-8"?>
+<p:sld xmlns:a="http://schemas.openxmlformats.org/drawingml/2006/main" xmlns:r="http://schemas.openxmlformats.org/officeDocument/2006/relationships" xmlns:p="http://schemas.openxmlformats.org/presentationml/2006/main">
+  <p:cSld>
+    <p:bg>
+      <p:bgPr>
+        <a:solidFill>
+          <a:schemeClr val="bg1"/>
+        </a:solidFill>
+        <a:effectLst/>
+      </p:bgPr>
+    </p:bg>
+    <p:spTree>
+      <p:nvGrpSpPr>
+        <p:cNvPr id="1" name="">
+          <a:extLst>
+            <a:ext uri="{FF2B5EF4-FFF2-40B4-BE49-F238E27FC236}">
+              <a16:creationId xmlns:a16="http://schemas.microsoft.com/office/drawing/2014/main" id="{A121FD82-5ED2-2BEB-E6E1-8377F5F30D07}"/>
+            </a:ext>
+          </a:extLst>
+        </p:cNvPr>
+        <p:cNvGrpSpPr/>
+        <p:nvPr/>
+      </p:nvGrpSpPr>
+      <p:grpSpPr>
+        <a:xfrm>
+          <a:off x="0" y="0"/>
+          <a:ext cx="0" cy="0"/>
+          <a:chOff x="0" y="0"/>
+          <a:chExt cx="0" cy="0"/>
+        </a:xfrm>
+      </p:grpSpPr>
+      <p:sp useBgFill="1">
+        <p:nvSpPr>
+          <p:cNvPr id="12" name="Rectangle 11">
+            <a:extLst>
+              <a:ext uri="{FF2B5EF4-FFF2-40B4-BE49-F238E27FC236}">
+                <a16:creationId xmlns:a16="http://schemas.microsoft.com/office/drawing/2014/main" id="{70108D9B-6391-5489-3FDC-F18D2D07D510}"/>
+              </a:ext>
+              <a:ext uri="{C183D7F6-B498-43B3-948B-1728B52AA6E4}">
+                <adec:decorative xmlns:adec="http://schemas.microsoft.com/office/drawing/2017/decorative" val="1"/>
+              </a:ext>
+            </a:extLst>
+          </p:cNvPr>
+          <p:cNvSpPr>
+            <a:spLocks noGrp="1" noRot="1" noChangeAspect="1" noMove="1" noResize="1" noEditPoints="1" noAdjustHandles="1" noChangeArrowheads="1" noChangeShapeType="1" noTextEdit="1"/>
+          </p:cNvSpPr>
+          <p:nvPr>
+            <p:extLst>
+              <p:ext uri="{386F3935-93C4-4BCD-93E2-E3B085C9AB24}">
+                <p16:designElem xmlns:p16="http://schemas.microsoft.com/office/powerpoint/2015/main" val="1"/>
+              </p:ext>
+            </p:extLst>
+          </p:nvPr>
+        </p:nvSpPr>
+        <p:spPr>
+          <a:xfrm>
+            <a:off x="0" y="0"/>
+            <a:ext cx="12192000" cy="6858000"/>
+          </a:xfrm>
+          <a:prstGeom prst="rect">
+            <a:avLst/>
+          </a:prstGeom>
+          <a:solidFill>
+            <a:schemeClr val="tx1"/>
+          </a:solidFill>
+          <a:ln w="12700" cap="flat" cmpd="sng" algn="ctr">
+            <a:noFill/>
+            <a:prstDash val="solid"/>
+            <a:miter lim="800000"/>
+          </a:ln>
+          <a:effectLst/>
+        </p:spPr>
+        <p:style>
+          <a:lnRef idx="2">
+            <a:schemeClr val="accent1">
+              <a:shade val="50000"/>
+            </a:schemeClr>
+          </a:lnRef>
+          <a:fillRef idx="1">
+            <a:schemeClr val="accent1"/>
+          </a:fillRef>
+          <a:effectRef idx="0">
+            <a:schemeClr val="accent1"/>
+          </a:effectRef>
+          <a:fontRef idx="minor">
+            <a:schemeClr val="lt1"/>
+          </a:fontRef>
+        </p:style>
+        <p:txBody>
+          <a:bodyPr rtlCol="0" anchor="ctr"/>
+          <a:lstStyle/>
+          <a:p>
+            <a:pPr marL="0" marR="0" lvl="0" indent="0" algn="ctr" defTabSz="914400" rtl="0" eaLnBrk="1" fontAlgn="auto" latinLnBrk="0" hangingPunct="1">
+              <a:lnSpc>
+                <a:spcPct val="100000"/>
+              </a:lnSpc>
+              <a:spcBef>
+                <a:spcPts val="0"/>
+              </a:spcBef>
+              <a:spcAft>
+                <a:spcPts val="0"/>
+              </a:spcAft>
+              <a:buClrTx/>
+              <a:buSzTx/>
+              <a:buFontTx/>
+              <a:buNone/>
+              <a:tabLst/>
+              <a:defRPr/>
+            </a:pPr>
+            <a:endParaRPr kumimoji="0" lang="en-US" sz="1800" b="0" i="0" u="none" strike="noStrike" kern="1200" cap="none" spc="0" normalizeH="0" baseline="0" noProof="0">
+              <a:ln>
+                <a:noFill/>
+              </a:ln>
+              <a:solidFill>
+                <a:prstClr val="white"/>
+              </a:solidFill>
+              <a:effectLst/>
+              <a:uLnTx/>
+              <a:uFillTx/>
+              <a:latin typeface="Aptos" panose="02110004020202020204"/>
+              <a:ea typeface="+mn-ea"/>
+              <a:cs typeface="+mn-cs"/>
+            </a:endParaRPr>
+          </a:p>
+        </p:txBody>
+      </p:sp>
+      <p:sp>
+        <p:nvSpPr>
+          <p:cNvPr id="2" name="Title 1">
+            <a:extLst>
+              <a:ext uri="{FF2B5EF4-FFF2-40B4-BE49-F238E27FC236}">
+                <a16:creationId xmlns:a16="http://schemas.microsoft.com/office/drawing/2014/main" id="{2DABCCE9-F47A-F308-4844-12F5C9CBAC7C}"/>
+              </a:ext>
+            </a:extLst>
+          </p:cNvPr>
+          <p:cNvSpPr>
+            <a:spLocks noGrp="1"/>
+          </p:cNvSpPr>
+          <p:nvPr>
+            <p:ph type="title"/>
+          </p:nvPr>
+        </p:nvSpPr>
+        <p:spPr>
+          <a:xfrm>
+            <a:off x="838199" y="371752"/>
+            <a:ext cx="8376921" cy="1323439"/>
+          </a:xfrm>
+        </p:spPr>
+        <p:txBody>
+          <a:bodyPr anchor="t">
+            <a:normAutofit/>
+          </a:bodyPr>
+          <a:lstStyle/>
+          <a:p>
+            <a:r>
+              <a:rPr lang="en-US" sz="4000" dirty="0">
+                <a:solidFill>
+                  <a:schemeClr val="bg1"/>
+                </a:solidFill>
+              </a:rPr>
+              <a:t>MCP Server – Time Source Code - Tool</a:t>
+            </a:r>
+            <a:endParaRPr lang="en-IN" sz="4000" dirty="0">
+              <a:solidFill>
+                <a:schemeClr val="bg1"/>
+              </a:solidFill>
+            </a:endParaRPr>
+          </a:p>
+        </p:txBody>
+      </p:sp>
+      <p:pic>
+        <p:nvPicPr>
+          <p:cNvPr id="4" name="Picture 3">
+            <a:extLst>
+              <a:ext uri="{FF2B5EF4-FFF2-40B4-BE49-F238E27FC236}">
+                <a16:creationId xmlns:a16="http://schemas.microsoft.com/office/drawing/2014/main" id="{053B1903-ED02-CCEA-62D8-F908A42A30D8}"/>
+              </a:ext>
+            </a:extLst>
+          </p:cNvPr>
+          <p:cNvPicPr>
+            <a:picLocks noChangeAspect="1"/>
+          </p:cNvPicPr>
+          <p:nvPr/>
+        </p:nvPicPr>
+        <p:blipFill>
+          <a:blip r:embed="rId2"/>
+          <a:stretch>
+            <a:fillRect/>
+          </a:stretch>
+        </p:blipFill>
+        <p:spPr>
+          <a:xfrm>
+            <a:off x="838199" y="1695191"/>
+            <a:ext cx="10686796" cy="4501459"/>
+          </a:xfrm>
+          <a:prstGeom prst="rect">
+            <a:avLst/>
+          </a:prstGeom>
+        </p:spPr>
+      </p:pic>
+    </p:spTree>
+    <p:extLst>
+      <p:ext uri="{BB962C8B-B14F-4D97-AF65-F5344CB8AC3E}">
+        <p14:creationId xmlns:p14="http://schemas.microsoft.com/office/powerpoint/2010/main" val="77571092"/>
+      </p:ext>
+    </p:extLst>
+  </p:cSld>
+  <p:clrMapOvr>
+    <a:masterClrMapping/>
+  </p:clrMapOvr>
+</p:sld>
+</file>
+
+<file path=ppt/slides/slide17.xml><?xml version="1.0" encoding="utf-8"?>
+<p:sld xmlns:a="http://schemas.openxmlformats.org/drawingml/2006/main" xmlns:r="http://schemas.openxmlformats.org/officeDocument/2006/relationships" xmlns:p="http://schemas.openxmlformats.org/presentationml/2006/main">
+  <p:cSld>
+    <p:bg>
+      <p:bgPr>
+        <a:solidFill>
+          <a:schemeClr val="bg1"/>
+        </a:solidFill>
+        <a:effectLst/>
+      </p:bgPr>
+    </p:bg>
+    <p:spTree>
+      <p:nvGrpSpPr>
+        <p:cNvPr id="1" name=""/>
+        <p:cNvGrpSpPr/>
+        <p:nvPr/>
+      </p:nvGrpSpPr>
+      <p:grpSpPr>
+        <a:xfrm>
+          <a:off x="0" y="0"/>
+          <a:ext cx="0" cy="0"/>
+          <a:chOff x="0" y="0"/>
+          <a:chExt cx="0" cy="0"/>
+        </a:xfrm>
+      </p:grpSpPr>
       <p:sp>
         <p:nvSpPr>
           <p:cNvPr id="8" name="Rectangle 7">
@@ -36679,7 +37478,7 @@
 </p:sld>
 </file>
 
-<file path=ppt/slides/slide15.xml><?xml version="1.0" encoding="utf-8"?>
+<file path=ppt/slides/slide18.xml><?xml version="1.0" encoding="utf-8"?>
 <p:sld xmlns:a="http://schemas.openxmlformats.org/drawingml/2006/main" xmlns:r="http://schemas.openxmlformats.org/officeDocument/2006/relationships" xmlns:p="http://schemas.openxmlformats.org/presentationml/2006/main">
   <p:cSld>
     <p:bg>
@@ -39145,390 +39944,6 @@
     <p:extLst>
       <p:ext uri="{BB962C8B-B14F-4D97-AF65-F5344CB8AC3E}">
         <p14:creationId xmlns:p14="http://schemas.microsoft.com/office/powerpoint/2010/main" val="715201626"/>
-      </p:ext>
-    </p:extLst>
-  </p:cSld>
-  <p:clrMapOvr>
-    <a:masterClrMapping/>
-  </p:clrMapOvr>
-</p:sld>
-</file>
-
-<file path=ppt/slides/slide16.xml><?xml version="1.0" encoding="utf-8"?>
-<p:sld xmlns:a="http://schemas.openxmlformats.org/drawingml/2006/main" xmlns:r="http://schemas.openxmlformats.org/officeDocument/2006/relationships" xmlns:p="http://schemas.openxmlformats.org/presentationml/2006/main">
-  <p:cSld>
-    <p:spTree>
-      <p:nvGrpSpPr>
-        <p:cNvPr id="1" name=""/>
-        <p:cNvGrpSpPr/>
-        <p:nvPr/>
-      </p:nvGrpSpPr>
-      <p:grpSpPr>
-        <a:xfrm>
-          <a:off x="0" y="0"/>
-          <a:ext cx="0" cy="0"/>
-          <a:chOff x="0" y="0"/>
-          <a:chExt cx="0" cy="0"/>
-        </a:xfrm>
-      </p:grpSpPr>
-      <p:sp>
-        <p:nvSpPr>
-          <p:cNvPr id="2" name="Title 1"/>
-          <p:cNvSpPr>
-            <a:spLocks noGrp="1"/>
-          </p:cNvSpPr>
-          <p:nvPr>
-            <p:ph type="title"/>
-          </p:nvPr>
-        </p:nvSpPr>
-        <p:spPr>
-          <a:xfrm>
-            <a:off x="962325" y="3092927"/>
-            <a:ext cx="2542068" cy="670067"/>
-          </a:xfrm>
-        </p:spPr>
-        <p:txBody>
-          <a:bodyPr>
-            <a:normAutofit fontScale="90000"/>
-          </a:bodyPr>
-          <a:lstStyle/>
-          <a:p>
-            <a:r>
-              <a:rPr lang="en-US"/>
-              <a:t>Thank you</a:t>
-            </a:r>
-            <a:br>
-              <a:rPr lang="en-US"/>
-            </a:br>
-            <a:br>
-              <a:rPr lang="en-US"/>
-            </a:br>
-            <a:r>
-              <a:rPr lang="en-US"/>
-              <a:t>Q &amp; A</a:t>
-            </a:r>
-            <a:endParaRPr lang="en-US" dirty="0"/>
-          </a:p>
-        </p:txBody>
-      </p:sp>
-      <p:sp>
-        <p:nvSpPr>
-          <p:cNvPr id="3" name="Content Placeholder 2"/>
-          <p:cNvSpPr>
-            <a:spLocks noGrp="1"/>
-          </p:cNvSpPr>
-          <p:nvPr>
-            <p:ph idx="1"/>
-          </p:nvPr>
-        </p:nvSpPr>
-        <p:spPr>
-          <a:xfrm>
-            <a:off x="5324566" y="468085"/>
-            <a:ext cx="6654074" cy="4855029"/>
-          </a:xfrm>
-        </p:spPr>
-        <p:txBody>
-          <a:bodyPr>
-            <a:normAutofit fontScale="25000" lnSpcReduction="20000"/>
-          </a:bodyPr>
-          <a:lstStyle/>
-          <a:p>
-            <a:pPr marL="0" indent="0">
-              <a:lnSpc>
-                <a:spcPct val="320000"/>
-              </a:lnSpc>
-              <a:buNone/>
-            </a:pPr>
-            <a:r>
-              <a:rPr lang="en-US" sz="8000" dirty="0">
-                <a:hlinkClick r:id="rId3"/>
-              </a:rPr>
-              <a:t>https://in.linkedin.com/in/praveenraghuvanshi</a:t>
-            </a:r>
-            <a:endParaRPr lang="en-US" sz="8000" dirty="0"/>
-          </a:p>
-          <a:p>
-            <a:pPr marL="0" indent="0">
-              <a:lnSpc>
-                <a:spcPct val="320000"/>
-              </a:lnSpc>
-              <a:buNone/>
-            </a:pPr>
-            <a:r>
-              <a:rPr lang="en-US" sz="8000" dirty="0">
-                <a:hlinkClick r:id="rId4"/>
-              </a:rPr>
-              <a:t>https://</a:t>
-            </a:r>
-            <a:r>
-              <a:rPr lang="en-US" sz="8000" dirty="0">
-                <a:hlinkClick r:id="" action="ppaction://noaction"/>
-              </a:rPr>
-              <a:t>github.com/praveenraghuvanshi</a:t>
-            </a:r>
-          </a:p>
-          <a:p>
-            <a:pPr marL="0" indent="0">
-              <a:lnSpc>
-                <a:spcPct val="320000"/>
-              </a:lnSpc>
-              <a:buNone/>
-            </a:pPr>
-            <a:r>
-              <a:rPr lang="en-US" sz="8000" dirty="0">
-                <a:hlinkClick r:id="" action="ppaction://noaction"/>
-              </a:rPr>
-              <a:t>@</a:t>
-            </a:r>
-            <a:r>
-              <a:rPr lang="en-US" sz="8000" dirty="0" err="1">
-                <a:hlinkClick r:id="rId4"/>
-              </a:rPr>
-              <a:t>praveenraghuvan</a:t>
-            </a:r>
-            <a:endParaRPr lang="en-US" sz="8000" dirty="0">
-              <a:hlinkClick r:id="rId4"/>
-            </a:endParaRPr>
-          </a:p>
-          <a:p>
-            <a:pPr marL="0" indent="0">
-              <a:lnSpc>
-                <a:spcPct val="320000"/>
-              </a:lnSpc>
-              <a:buNone/>
-            </a:pPr>
-            <a:endParaRPr lang="en-US" sz="8000" dirty="0"/>
-          </a:p>
-        </p:txBody>
-      </p:sp>
-      <p:pic>
-        <p:nvPicPr>
-          <p:cNvPr id="5" name="Picture 4"/>
-          <p:cNvPicPr>
-            <a:picLocks noChangeAspect="1"/>
-          </p:cNvPicPr>
-          <p:nvPr/>
-        </p:nvPicPr>
-        <p:blipFill>
-          <a:blip r:embed="rId5">
-            <a:extLst>
-              <a:ext uri="{28A0092B-C50C-407E-A947-70E740481C1C}">
-                <a14:useLocalDpi xmlns:a14="http://schemas.microsoft.com/office/drawing/2010/main" val="0"/>
-              </a:ext>
-            </a:extLst>
-          </a:blip>
-          <a:stretch>
-            <a:fillRect/>
-          </a:stretch>
-        </p:blipFill>
-        <p:spPr>
-          <a:xfrm>
-            <a:off x="4557347" y="1032750"/>
-            <a:ext cx="654761" cy="654761"/>
-          </a:xfrm>
-          <a:prstGeom prst="rect">
-            <a:avLst/>
-          </a:prstGeom>
-        </p:spPr>
-      </p:pic>
-      <p:pic>
-        <p:nvPicPr>
-          <p:cNvPr id="9" name="Picture 8"/>
-          <p:cNvPicPr>
-            <a:picLocks noChangeAspect="1"/>
-          </p:cNvPicPr>
-          <p:nvPr/>
-        </p:nvPicPr>
-        <p:blipFill>
-          <a:blip r:embed="rId6">
-            <a:extLst>
-              <a:ext uri="{28A0092B-C50C-407E-A947-70E740481C1C}">
-                <a14:useLocalDpi xmlns:a14="http://schemas.microsoft.com/office/drawing/2010/main" val="0"/>
-              </a:ext>
-            </a:extLst>
-          </a:blip>
-          <a:stretch>
-            <a:fillRect/>
-          </a:stretch>
-        </p:blipFill>
-        <p:spPr>
-          <a:xfrm>
-            <a:off x="4623538" y="3838342"/>
-            <a:ext cx="470611" cy="470611"/>
-          </a:xfrm>
-          <a:prstGeom prst="rect">
-            <a:avLst/>
-          </a:prstGeom>
-        </p:spPr>
-      </p:pic>
-      <p:sp>
-        <p:nvSpPr>
-          <p:cNvPr id="4" name="TextBox 3"/>
-          <p:cNvSpPr txBox="1"/>
-          <p:nvPr/>
-        </p:nvSpPr>
-        <p:spPr>
-          <a:xfrm>
-            <a:off x="5287555" y="4708647"/>
-            <a:ext cx="6728096" cy="492443"/>
-          </a:xfrm>
-          <a:prstGeom prst="rect">
-            <a:avLst/>
-          </a:prstGeom>
-          <a:noFill/>
-        </p:spPr>
-        <p:txBody>
-          <a:bodyPr wrap="square" rtlCol="0">
-            <a:spAutoFit/>
-          </a:bodyPr>
-          <a:lstStyle/>
-          <a:p>
-            <a:r>
-              <a:rPr lang="en-US" sz="2600">
-                <a:solidFill>
-                  <a:schemeClr val="tx1">
-                    <a:lumMod val="75000"/>
-                    <a:lumOff val="25000"/>
-                  </a:schemeClr>
-                </a:solidFill>
-                <a:hlinkClick r:id="rId7"/>
-              </a:rPr>
-              <a:t>https://t.me/joinchat/IifUJQ_PuYT757Turx-nLg </a:t>
-            </a:r>
-            <a:endParaRPr lang="en-US" sz="2600" dirty="0">
-              <a:solidFill>
-                <a:schemeClr val="tx1">
-                  <a:lumMod val="75000"/>
-                  <a:lumOff val="25000"/>
-                </a:schemeClr>
-              </a:solidFill>
-            </a:endParaRPr>
-          </a:p>
-        </p:txBody>
-      </p:sp>
-      <p:pic>
-        <p:nvPicPr>
-          <p:cNvPr id="1032" name="Picture 8" descr="circle messenger round icon telegram icon #21808"/>
-          <p:cNvPicPr>
-            <a:picLocks noChangeAspect="1" noChangeArrowheads="1"/>
-          </p:cNvPicPr>
-          <p:nvPr/>
-        </p:nvPicPr>
-        <p:blipFill>
-          <a:blip r:embed="rId8">
-            <a:extLst>
-              <a:ext uri="{28A0092B-C50C-407E-A947-70E740481C1C}">
-                <a14:useLocalDpi xmlns:a14="http://schemas.microsoft.com/office/drawing/2010/main" val="0"/>
-              </a:ext>
-            </a:extLst>
-          </a:blip>
-          <a:srcRect/>
-          <a:stretch>
-            <a:fillRect/>
-          </a:stretch>
-        </p:blipFill>
-        <p:spPr bwMode="auto">
-          <a:xfrm>
-            <a:off x="4600026" y="4708647"/>
-            <a:ext cx="494123" cy="494123"/>
-          </a:xfrm>
-          <a:prstGeom prst="rect">
-            <a:avLst/>
-          </a:prstGeom>
-          <a:noFill/>
-          <a:extLst>
-            <a:ext uri="{909E8E84-426E-40DD-AFC4-6F175D3DCCD1}">
-              <a14:hiddenFill xmlns:a14="http://schemas.microsoft.com/office/drawing/2010/main">
-                <a:solidFill>
-                  <a:srgbClr val="FFFFFF"/>
-                </a:solidFill>
-              </a14:hiddenFill>
-            </a:ext>
-          </a:extLst>
-        </p:spPr>
-      </p:pic>
-      <p:pic>
-        <p:nvPicPr>
-          <p:cNvPr id="7" name="Picture 6"/>
-          <p:cNvPicPr>
-            <a:picLocks noChangeAspect="1"/>
-          </p:cNvPicPr>
-          <p:nvPr/>
-        </p:nvPicPr>
-        <p:blipFill>
-          <a:blip r:embed="rId9"/>
-          <a:stretch>
-            <a:fillRect/>
-          </a:stretch>
-        </p:blipFill>
-        <p:spPr>
-          <a:xfrm>
-            <a:off x="4623538" y="2438036"/>
-            <a:ext cx="523875" cy="533400"/>
-          </a:xfrm>
-          <a:prstGeom prst="rect">
-            <a:avLst/>
-          </a:prstGeom>
-        </p:spPr>
-      </p:pic>
-      <p:pic>
-        <p:nvPicPr>
-          <p:cNvPr id="8" name="Picture 7"/>
-          <p:cNvPicPr>
-            <a:picLocks noChangeAspect="1"/>
-          </p:cNvPicPr>
-          <p:nvPr/>
-        </p:nvPicPr>
-        <p:blipFill>
-          <a:blip r:embed="rId10"/>
-          <a:stretch>
-            <a:fillRect/>
-          </a:stretch>
-        </p:blipFill>
-        <p:spPr>
-          <a:xfrm>
-            <a:off x="4623538" y="2438036"/>
-            <a:ext cx="523875" cy="533400"/>
-          </a:xfrm>
-          <a:prstGeom prst="rect">
-            <a:avLst/>
-          </a:prstGeom>
-        </p:spPr>
-      </p:pic>
-      <p:pic>
-        <p:nvPicPr>
-          <p:cNvPr id="6" name="Picture 5">
-            <a:extLst>
-              <a:ext uri="{FF2B5EF4-FFF2-40B4-BE49-F238E27FC236}">
-                <a16:creationId xmlns:a16="http://schemas.microsoft.com/office/drawing/2014/main" id="{A3BEFBD2-E6C3-09FB-7D4A-FC73B0CA98A9}"/>
-              </a:ext>
-            </a:extLst>
-          </p:cNvPr>
-          <p:cNvPicPr>
-            <a:picLocks noChangeAspect="1"/>
-          </p:cNvPicPr>
-          <p:nvPr/>
-        </p:nvPicPr>
-        <p:blipFill>
-          <a:blip r:embed="rId11"/>
-          <a:stretch>
-            <a:fillRect/>
-          </a:stretch>
-        </p:blipFill>
-        <p:spPr>
-          <a:xfrm>
-            <a:off x="10561314" y="33090"/>
-            <a:ext cx="1630685" cy="365125"/>
-          </a:xfrm>
-          <a:prstGeom prst="rect">
-            <a:avLst/>
-          </a:prstGeom>
-        </p:spPr>
-      </p:pic>
-    </p:spTree>
-    <p:extLst>
-      <p:ext uri="{BB962C8B-B14F-4D97-AF65-F5344CB8AC3E}">
-        <p14:creationId xmlns:p14="http://schemas.microsoft.com/office/powerpoint/2010/main" val="1450058678"/>
       </p:ext>
     </p:extLst>
   </p:cSld>

</xml_diff>